<commit_message>
slides: minor slide edits prior to session 2
</commit_message>
<xml_diff>
--- a/slides/fileIO.pptx
+++ b/slides/fileIO.pptx
@@ -202,7 +202,7 @@
           <a:p>
             <a:fld id="{1F23A399-7F87-6D46-845D-8770B3B26D43}" type="datetimeFigureOut">
               <a:rPr lang="en-US" smtClean="0"/>
-              <a:t>5/7/21</a:t>
+              <a:t>5/12/21</a:t>
             </a:fld>
             <a:endParaRPr lang="en-US"/>
           </a:p>
@@ -266,38 +266,37 @@
           <a:p>
             <a:pPr lvl="0"/>
             <a:r>
-              <a:rPr lang="en-US" smtClean="0"/>
+              <a:rPr lang="en-US"/>
               <a:t>Click to edit Master text styles</a:t>
             </a:r>
           </a:p>
           <a:p>
             <a:pPr lvl="1"/>
             <a:r>
-              <a:rPr lang="en-US" smtClean="0"/>
+              <a:rPr lang="en-US"/>
               <a:t>Second level</a:t>
             </a:r>
           </a:p>
           <a:p>
             <a:pPr lvl="2"/>
             <a:r>
-              <a:rPr lang="en-US" smtClean="0"/>
+              <a:rPr lang="en-US"/>
               <a:t>Third level</a:t>
             </a:r>
           </a:p>
           <a:p>
             <a:pPr lvl="3"/>
             <a:r>
-              <a:rPr lang="en-US" smtClean="0"/>
+              <a:rPr lang="en-US"/>
               <a:t>Fourth level</a:t>
             </a:r>
           </a:p>
           <a:p>
             <a:pPr lvl="4"/>
             <a:r>
-              <a:rPr lang="en-US" smtClean="0"/>
+              <a:rPr lang="en-US"/>
               <a:t>Fifth level</a:t>
             </a:r>
-            <a:endParaRPr lang="en-US"/>
           </a:p>
         </p:txBody>
       </p:sp>
@@ -515,19 +514,19 @@
           <a:lstStyle/>
           <a:p>
             <a:r>
-              <a:rPr lang="en-US" dirty="0" smtClean="0"/>
+              <a:rPr lang="en-US" dirty="0"/>
               <a:t>We</a:t>
             </a:r>
             <a:r>
-              <a:rPr lang="en-US" baseline="0" dirty="0" smtClean="0"/>
+              <a:rPr lang="en-US" baseline="0" dirty="0"/>
               <a:t> will cover more on </a:t>
             </a:r>
             <a:r>
-              <a:rPr lang="en-US" baseline="0" dirty="0" err="1" smtClean="0"/>
+              <a:rPr lang="en-US" baseline="0" dirty="0" err="1"/>
               <a:t>NumPy</a:t>
             </a:r>
             <a:r>
-              <a:rPr lang="en-US" baseline="0" smtClean="0"/>
+              <a:rPr lang="en-US" baseline="0"/>
               <a:t> and Anaconda in the next session!</a:t>
             </a:r>
             <a:endParaRPr lang="en-US"/>
@@ -757,10 +756,9 @@
           </a:lstStyle>
           <a:p>
             <a:r>
-              <a:rPr lang="en-US" dirty="0" smtClean="0"/>
+              <a:rPr lang="en-US" dirty="0"/>
               <a:t>Click to edit Master title style</a:t>
             </a:r>
-            <a:endParaRPr lang="en-US" dirty="0"/>
           </a:p>
         </p:txBody>
       </p:sp>
@@ -824,10 +822,9 @@
           </a:lstStyle>
           <a:p>
             <a:r>
-              <a:rPr lang="en-US" dirty="0" smtClean="0"/>
+              <a:rPr lang="en-US" dirty="0"/>
               <a:t>Click to edit Master subtitle style</a:t>
             </a:r>
-            <a:endParaRPr lang="en-US" dirty="0"/>
           </a:p>
         </p:txBody>
       </p:sp>
@@ -848,7 +845,7 @@
           <a:p>
             <a:fld id="{51673806-0BCD-1F42-BAA8-2011034B3C6A}" type="datetimeFigureOut">
               <a:rPr lang="en-US" smtClean="0"/>
-              <a:t>5/7/21</a:t>
+              <a:t>5/12/21</a:t>
             </a:fld>
             <a:endParaRPr lang="en-US"/>
           </a:p>
@@ -1097,7 +1094,7 @@
           </a:lstStyle>
           <a:p>
             <a:r>
-              <a:rPr lang="en-US" smtClean="0"/>
+              <a:rPr lang="en-US"/>
               <a:t>Click to edit Master title style</a:t>
             </a:r>
             <a:endParaRPr lang="en-US" dirty="0"/>
@@ -1173,7 +1170,7 @@
           </a:lstStyle>
           <a:p>
             <a:r>
-              <a:rPr lang="en-US" smtClean="0"/>
+              <a:rPr lang="en-US"/>
               <a:t>Drag picture to placeholder or click icon to add</a:t>
             </a:r>
             <a:endParaRPr lang="en-US" dirty="0"/>
@@ -1239,7 +1236,7 @@
           <a:p>
             <a:pPr lvl="0"/>
             <a:r>
-              <a:rPr lang="en-US" smtClean="0"/>
+              <a:rPr lang="en-US"/>
               <a:t>Click to edit Master text styles</a:t>
             </a:r>
           </a:p>
@@ -1262,7 +1259,7 @@
           <a:p>
             <a:fld id="{51673806-0BCD-1F42-BAA8-2011034B3C6A}" type="datetimeFigureOut">
               <a:rPr lang="en-US" smtClean="0"/>
-              <a:t>5/7/21</a:t>
+              <a:t>5/12/21</a:t>
             </a:fld>
             <a:endParaRPr lang="en-US"/>
           </a:p>
@@ -1504,7 +1501,7 @@
           </a:lstStyle>
           <a:p>
             <a:r>
-              <a:rPr lang="en-US" smtClean="0"/>
+              <a:rPr lang="en-US"/>
               <a:t>Click to edit Master title style</a:t>
             </a:r>
             <a:endParaRPr lang="en-US" dirty="0"/>
@@ -1570,7 +1567,7 @@
           <a:p>
             <a:pPr lvl="0"/>
             <a:r>
-              <a:rPr lang="en-US" smtClean="0"/>
+              <a:rPr lang="en-US"/>
               <a:t>Click to edit Master text styles</a:t>
             </a:r>
           </a:p>
@@ -1593,7 +1590,7 @@
           <a:p>
             <a:fld id="{51673806-0BCD-1F42-BAA8-2011034B3C6A}" type="datetimeFigureOut">
               <a:rPr lang="en-US" smtClean="0"/>
-              <a:t>5/7/21</a:t>
+              <a:t>5/12/21</a:t>
             </a:fld>
             <a:endParaRPr lang="en-US"/>
           </a:p>
@@ -1835,7 +1832,7 @@
           </a:lstStyle>
           <a:p>
             <a:r>
-              <a:rPr lang="en-US" smtClean="0"/>
+              <a:rPr lang="en-US"/>
               <a:t>Click to edit Master title style</a:t>
             </a:r>
             <a:endParaRPr lang="en-US" dirty="0"/>
@@ -1903,7 +1900,7 @@
           <a:p>
             <a:pPr lvl="0"/>
             <a:r>
-              <a:rPr lang="en-US" smtClean="0"/>
+              <a:rPr lang="en-US"/>
               <a:t>Click to edit Master text styles</a:t>
             </a:r>
           </a:p>
@@ -1970,7 +1967,7 @@
           <a:p>
             <a:pPr lvl="0"/>
             <a:r>
-              <a:rPr lang="en-US" smtClean="0"/>
+              <a:rPr lang="en-US"/>
               <a:t>Click to edit Master text styles</a:t>
             </a:r>
           </a:p>
@@ -1993,7 +1990,7 @@
           <a:p>
             <a:fld id="{51673806-0BCD-1F42-BAA8-2011034B3C6A}" type="datetimeFigureOut">
               <a:rPr lang="en-US" smtClean="0"/>
-              <a:t>5/7/21</a:t>
+              <a:t>5/12/21</a:t>
             </a:fld>
             <a:endParaRPr lang="en-US"/>
           </a:p>
@@ -2467,7 +2464,7 @@
           </a:lstStyle>
           <a:p>
             <a:r>
-              <a:rPr lang="en-US" smtClean="0"/>
+              <a:rPr lang="en-US"/>
               <a:t>Click to edit Master title style</a:t>
             </a:r>
             <a:endParaRPr lang="en-US" dirty="0"/>
@@ -2533,7 +2530,7 @@
           <a:p>
             <a:pPr lvl="0"/>
             <a:r>
-              <a:rPr lang="en-US" smtClean="0"/>
+              <a:rPr lang="en-US"/>
               <a:t>Click to edit Master text styles</a:t>
             </a:r>
           </a:p>
@@ -2556,7 +2553,7 @@
           <a:p>
             <a:fld id="{51673806-0BCD-1F42-BAA8-2011034B3C6A}" type="datetimeFigureOut">
               <a:rPr lang="en-US" smtClean="0"/>
-              <a:t>5/7/21</a:t>
+              <a:t>5/12/21</a:t>
             </a:fld>
             <a:endParaRPr lang="en-US"/>
           </a:p>
@@ -2794,7 +2791,7 @@
           <a:lstStyle/>
           <a:p>
             <a:r>
-              <a:rPr lang="en-US" smtClean="0"/>
+              <a:rPr lang="en-US"/>
               <a:t>Click to edit Master title style</a:t>
             </a:r>
             <a:endParaRPr lang="en-US" dirty="0"/>
@@ -2866,7 +2863,7 @@
           <a:p>
             <a:pPr lvl="0"/>
             <a:r>
-              <a:rPr lang="en-US" smtClean="0"/>
+              <a:rPr lang="en-US"/>
               <a:t>Click to edit Master text styles</a:t>
             </a:r>
           </a:p>
@@ -2933,7 +2930,7 @@
           <a:p>
             <a:pPr lvl="0"/>
             <a:r>
-              <a:rPr lang="en-US" smtClean="0"/>
+              <a:rPr lang="en-US"/>
               <a:t>Click to edit Master text styles</a:t>
             </a:r>
           </a:p>
@@ -3004,7 +3001,7 @@
           <a:p>
             <a:pPr lvl="0"/>
             <a:r>
-              <a:rPr lang="en-US" smtClean="0"/>
+              <a:rPr lang="en-US"/>
               <a:t>Click to edit Master text styles</a:t>
             </a:r>
           </a:p>
@@ -3071,7 +3068,7 @@
           <a:p>
             <a:pPr lvl="0"/>
             <a:r>
-              <a:rPr lang="en-US" smtClean="0"/>
+              <a:rPr lang="en-US"/>
               <a:t>Click to edit Master text styles</a:t>
             </a:r>
           </a:p>
@@ -3142,7 +3139,7 @@
           <a:p>
             <a:pPr lvl="0"/>
             <a:r>
-              <a:rPr lang="en-US" smtClean="0"/>
+              <a:rPr lang="en-US"/>
               <a:t>Click to edit Master text styles</a:t>
             </a:r>
           </a:p>
@@ -3209,7 +3206,7 @@
           <a:p>
             <a:pPr lvl="0"/>
             <a:r>
-              <a:rPr lang="en-US" smtClean="0"/>
+              <a:rPr lang="en-US"/>
               <a:t>Click to edit Master text styles</a:t>
             </a:r>
           </a:p>
@@ -3232,7 +3229,7 @@
           <a:p>
             <a:fld id="{51673806-0BCD-1F42-BAA8-2011034B3C6A}" type="datetimeFigureOut">
               <a:rPr lang="en-US" smtClean="0"/>
-              <a:t>5/7/21</a:t>
+              <a:t>5/12/21</a:t>
             </a:fld>
             <a:endParaRPr lang="en-US"/>
           </a:p>
@@ -3465,7 +3462,7 @@
           <a:lstStyle/>
           <a:p>
             <a:r>
-              <a:rPr lang="en-US" smtClean="0"/>
+              <a:rPr lang="en-US"/>
               <a:t>Click to edit Master title style</a:t>
             </a:r>
             <a:endParaRPr lang="en-US" dirty="0"/>
@@ -3537,7 +3534,7 @@
           <a:p>
             <a:pPr lvl="0"/>
             <a:r>
-              <a:rPr lang="en-US" smtClean="0"/>
+              <a:rPr lang="en-US"/>
               <a:t>Click to edit Master text styles</a:t>
             </a:r>
           </a:p>
@@ -3615,7 +3612,7 @@
           </a:lstStyle>
           <a:p>
             <a:r>
-              <a:rPr lang="en-US" smtClean="0"/>
+              <a:rPr lang="en-US"/>
               <a:t>Drag picture to placeholder or click icon to add</a:t>
             </a:r>
             <a:endParaRPr lang="en-US" dirty="0"/>
@@ -3683,7 +3680,7 @@
           <a:p>
             <a:pPr lvl="0"/>
             <a:r>
-              <a:rPr lang="en-US" smtClean="0"/>
+              <a:rPr lang="en-US"/>
               <a:t>Click to edit Master text styles</a:t>
             </a:r>
           </a:p>
@@ -3754,7 +3751,7 @@
           <a:p>
             <a:pPr lvl="0"/>
             <a:r>
-              <a:rPr lang="en-US" smtClean="0"/>
+              <a:rPr lang="en-US"/>
               <a:t>Click to edit Master text styles</a:t>
             </a:r>
           </a:p>
@@ -3832,7 +3829,7 @@
           </a:lstStyle>
           <a:p>
             <a:r>
-              <a:rPr lang="en-US" smtClean="0"/>
+              <a:rPr lang="en-US"/>
               <a:t>Drag picture to placeholder or click icon to add</a:t>
             </a:r>
             <a:endParaRPr lang="en-US" dirty="0"/>
@@ -3900,7 +3897,7 @@
           <a:p>
             <a:pPr lvl="0"/>
             <a:r>
-              <a:rPr lang="en-US" smtClean="0"/>
+              <a:rPr lang="en-US"/>
               <a:t>Click to edit Master text styles</a:t>
             </a:r>
           </a:p>
@@ -3971,7 +3968,7 @@
           <a:p>
             <a:pPr lvl="0"/>
             <a:r>
-              <a:rPr lang="en-US" smtClean="0"/>
+              <a:rPr lang="en-US"/>
               <a:t>Click to edit Master text styles</a:t>
             </a:r>
           </a:p>
@@ -4049,7 +4046,7 @@
           </a:lstStyle>
           <a:p>
             <a:r>
-              <a:rPr lang="en-US" smtClean="0"/>
+              <a:rPr lang="en-US"/>
               <a:t>Drag picture to placeholder or click icon to add</a:t>
             </a:r>
             <a:endParaRPr lang="en-US" dirty="0"/>
@@ -4117,7 +4114,7 @@
           <a:p>
             <a:pPr lvl="0"/>
             <a:r>
-              <a:rPr lang="en-US" smtClean="0"/>
+              <a:rPr lang="en-US"/>
               <a:t>Click to edit Master text styles</a:t>
             </a:r>
           </a:p>
@@ -4140,7 +4137,7 @@
           <a:p>
             <a:fld id="{51673806-0BCD-1F42-BAA8-2011034B3C6A}" type="datetimeFigureOut">
               <a:rPr lang="en-US" smtClean="0"/>
-              <a:t>5/7/21</a:t>
+              <a:t>5/12/21</a:t>
             </a:fld>
             <a:endParaRPr lang="en-US"/>
           </a:p>
@@ -4372,7 +4369,7 @@
           </a:lstStyle>
           <a:p>
             <a:r>
-              <a:rPr lang="en-US" smtClean="0"/>
+              <a:rPr lang="en-US"/>
               <a:t>Click to edit Master title style</a:t>
             </a:r>
             <a:endParaRPr lang="en-US" dirty="0"/>
@@ -4396,35 +4393,35 @@
           <a:p>
             <a:pPr lvl="0"/>
             <a:r>
-              <a:rPr lang="en-US" smtClean="0"/>
+              <a:rPr lang="en-US"/>
               <a:t>Click to edit Master text styles</a:t>
             </a:r>
           </a:p>
           <a:p>
             <a:pPr lvl="1"/>
             <a:r>
-              <a:rPr lang="en-US" smtClean="0"/>
+              <a:rPr lang="en-US"/>
               <a:t>Second level</a:t>
             </a:r>
           </a:p>
           <a:p>
             <a:pPr lvl="2"/>
             <a:r>
-              <a:rPr lang="en-US" smtClean="0"/>
+              <a:rPr lang="en-US"/>
               <a:t>Third level</a:t>
             </a:r>
           </a:p>
           <a:p>
             <a:pPr lvl="3"/>
             <a:r>
-              <a:rPr lang="en-US" smtClean="0"/>
+              <a:rPr lang="en-US"/>
               <a:t>Fourth level</a:t>
             </a:r>
           </a:p>
           <a:p>
             <a:pPr lvl="4"/>
             <a:r>
-              <a:rPr lang="en-US" smtClean="0"/>
+              <a:rPr lang="en-US"/>
               <a:t>Fifth level</a:t>
             </a:r>
             <a:endParaRPr lang="en-US" dirty="0"/>
@@ -4448,7 +4445,7 @@
           <a:p>
             <a:fld id="{51673806-0BCD-1F42-BAA8-2011034B3C6A}" type="datetimeFigureOut">
               <a:rPr lang="en-US" smtClean="0"/>
-              <a:t>5/7/21</a:t>
+              <a:t>5/12/21</a:t>
             </a:fld>
             <a:endParaRPr lang="en-US"/>
           </a:p>
@@ -4621,7 +4618,7 @@
           <a:lstStyle/>
           <a:p>
             <a:r>
-              <a:rPr lang="en-US" smtClean="0"/>
+              <a:rPr lang="en-US"/>
               <a:t>Click to edit Master title style</a:t>
             </a:r>
             <a:endParaRPr lang="en-US" dirty="0"/>
@@ -4650,35 +4647,35 @@
           <a:p>
             <a:pPr lvl="0"/>
             <a:r>
-              <a:rPr lang="en-US" smtClean="0"/>
+              <a:rPr lang="en-US"/>
               <a:t>Click to edit Master text styles</a:t>
             </a:r>
           </a:p>
           <a:p>
             <a:pPr lvl="1"/>
             <a:r>
-              <a:rPr lang="en-US" smtClean="0"/>
+              <a:rPr lang="en-US"/>
               <a:t>Second level</a:t>
             </a:r>
           </a:p>
           <a:p>
             <a:pPr lvl="2"/>
             <a:r>
-              <a:rPr lang="en-US" smtClean="0"/>
+              <a:rPr lang="en-US"/>
               <a:t>Third level</a:t>
             </a:r>
           </a:p>
           <a:p>
             <a:pPr lvl="3"/>
             <a:r>
-              <a:rPr lang="en-US" smtClean="0"/>
+              <a:rPr lang="en-US"/>
               <a:t>Fourth level</a:t>
             </a:r>
           </a:p>
           <a:p>
             <a:pPr lvl="4"/>
             <a:r>
-              <a:rPr lang="en-US" smtClean="0"/>
+              <a:rPr lang="en-US"/>
               <a:t>Fifth level</a:t>
             </a:r>
             <a:endParaRPr lang="en-US" dirty="0"/>
@@ -4707,7 +4704,7 @@
           <a:p>
             <a:fld id="{51673806-0BCD-1F42-BAA8-2011034B3C6A}" type="datetimeFigureOut">
               <a:rPr lang="en-US" smtClean="0"/>
-              <a:t>5/7/21</a:t>
+              <a:t>5/12/21</a:t>
             </a:fld>
             <a:endParaRPr lang="en-US"/>
           </a:p>
@@ -4954,7 +4951,7 @@
           <a:lstStyle/>
           <a:p>
             <a:r>
-              <a:rPr lang="en-US" smtClean="0"/>
+              <a:rPr lang="en-US"/>
               <a:t>Click to edit Master title style</a:t>
             </a:r>
             <a:endParaRPr lang="en-US" dirty="0"/>
@@ -4978,35 +4975,35 @@
           <a:p>
             <a:pPr lvl="0"/>
             <a:r>
-              <a:rPr lang="en-US" smtClean="0"/>
+              <a:rPr lang="en-US"/>
               <a:t>Click to edit Master text styles</a:t>
             </a:r>
           </a:p>
           <a:p>
             <a:pPr lvl="1"/>
             <a:r>
-              <a:rPr lang="en-US" smtClean="0"/>
+              <a:rPr lang="en-US"/>
               <a:t>Second level</a:t>
             </a:r>
           </a:p>
           <a:p>
             <a:pPr lvl="2"/>
             <a:r>
-              <a:rPr lang="en-US" smtClean="0"/>
+              <a:rPr lang="en-US"/>
               <a:t>Third level</a:t>
             </a:r>
           </a:p>
           <a:p>
             <a:pPr lvl="3"/>
             <a:r>
-              <a:rPr lang="en-US" smtClean="0"/>
+              <a:rPr lang="en-US"/>
               <a:t>Fourth level</a:t>
             </a:r>
           </a:p>
           <a:p>
             <a:pPr lvl="4"/>
             <a:r>
-              <a:rPr lang="en-US" smtClean="0"/>
+              <a:rPr lang="en-US"/>
               <a:t>Fifth level</a:t>
             </a:r>
             <a:endParaRPr lang="en-US" dirty="0"/>
@@ -5030,7 +5027,7 @@
           <a:p>
             <a:fld id="{51673806-0BCD-1F42-BAA8-2011034B3C6A}" type="datetimeFigureOut">
               <a:rPr lang="en-US" smtClean="0"/>
-              <a:t>5/7/21</a:t>
+              <a:t>5/12/21</a:t>
             </a:fld>
             <a:endParaRPr lang="en-US"/>
           </a:p>
@@ -5269,7 +5266,7 @@
           </a:lstStyle>
           <a:p>
             <a:r>
-              <a:rPr lang="en-US" smtClean="0"/>
+              <a:rPr lang="en-US"/>
               <a:t>Click to edit Master title style</a:t>
             </a:r>
             <a:endParaRPr lang="en-US" dirty="0"/>
@@ -5391,7 +5388,7 @@
           <a:p>
             <a:pPr lvl="0"/>
             <a:r>
-              <a:rPr lang="en-US" smtClean="0"/>
+              <a:rPr lang="en-US"/>
               <a:t>Click to edit Master text styles</a:t>
             </a:r>
           </a:p>
@@ -5414,7 +5411,7 @@
           <a:p>
             <a:fld id="{51673806-0BCD-1F42-BAA8-2011034B3C6A}" type="datetimeFigureOut">
               <a:rPr lang="en-US" smtClean="0"/>
-              <a:t>5/7/21</a:t>
+              <a:t>5/12/21</a:t>
             </a:fld>
             <a:endParaRPr lang="en-US"/>
           </a:p>
@@ -5652,7 +5649,7 @@
           <a:lstStyle/>
           <a:p>
             <a:r>
-              <a:rPr lang="en-US" smtClean="0"/>
+              <a:rPr lang="en-US"/>
               <a:t>Click to edit Master title style</a:t>
             </a:r>
             <a:endParaRPr lang="en-US" dirty="0"/>
@@ -5681,35 +5678,35 @@
           <a:p>
             <a:pPr lvl="0"/>
             <a:r>
-              <a:rPr lang="en-US" smtClean="0"/>
+              <a:rPr lang="en-US"/>
               <a:t>Click to edit Master text styles</a:t>
             </a:r>
           </a:p>
           <a:p>
             <a:pPr lvl="1"/>
             <a:r>
-              <a:rPr lang="en-US" smtClean="0"/>
+              <a:rPr lang="en-US"/>
               <a:t>Second level</a:t>
             </a:r>
           </a:p>
           <a:p>
             <a:pPr lvl="2"/>
             <a:r>
-              <a:rPr lang="en-US" smtClean="0"/>
+              <a:rPr lang="en-US"/>
               <a:t>Third level</a:t>
             </a:r>
           </a:p>
           <a:p>
             <a:pPr lvl="3"/>
             <a:r>
-              <a:rPr lang="en-US" smtClean="0"/>
+              <a:rPr lang="en-US"/>
               <a:t>Fourth level</a:t>
             </a:r>
           </a:p>
           <a:p>
             <a:pPr lvl="4"/>
             <a:r>
-              <a:rPr lang="en-US" smtClean="0"/>
+              <a:rPr lang="en-US"/>
               <a:t>Fifth level</a:t>
             </a:r>
             <a:endParaRPr lang="en-US" dirty="0"/>
@@ -5738,35 +5735,35 @@
           <a:p>
             <a:pPr lvl="0"/>
             <a:r>
-              <a:rPr lang="en-US" smtClean="0"/>
+              <a:rPr lang="en-US"/>
               <a:t>Click to edit Master text styles</a:t>
             </a:r>
           </a:p>
           <a:p>
             <a:pPr lvl="1"/>
             <a:r>
-              <a:rPr lang="en-US" smtClean="0"/>
+              <a:rPr lang="en-US"/>
               <a:t>Second level</a:t>
             </a:r>
           </a:p>
           <a:p>
             <a:pPr lvl="2"/>
             <a:r>
-              <a:rPr lang="en-US" smtClean="0"/>
+              <a:rPr lang="en-US"/>
               <a:t>Third level</a:t>
             </a:r>
           </a:p>
           <a:p>
             <a:pPr lvl="3"/>
             <a:r>
-              <a:rPr lang="en-US" smtClean="0"/>
+              <a:rPr lang="en-US"/>
               <a:t>Fourth level</a:t>
             </a:r>
           </a:p>
           <a:p>
             <a:pPr lvl="4"/>
             <a:r>
-              <a:rPr lang="en-US" smtClean="0"/>
+              <a:rPr lang="en-US"/>
               <a:t>Fifth level</a:t>
             </a:r>
             <a:endParaRPr lang="en-US" dirty="0"/>
@@ -5790,7 +5787,7 @@
           <a:p>
             <a:fld id="{51673806-0BCD-1F42-BAA8-2011034B3C6A}" type="datetimeFigureOut">
               <a:rPr lang="en-US" smtClean="0"/>
-              <a:t>5/7/21</a:t>
+              <a:t>5/12/21</a:t>
             </a:fld>
             <a:endParaRPr lang="en-US"/>
           </a:p>
@@ -6028,7 +6025,7 @@
           <a:lstStyle/>
           <a:p>
             <a:r>
-              <a:rPr lang="en-US" smtClean="0"/>
+              <a:rPr lang="en-US"/>
               <a:t>Click to edit Master title style</a:t>
             </a:r>
             <a:endParaRPr lang="en-US" dirty="0"/>
@@ -6094,7 +6091,7 @@
           <a:p>
             <a:pPr lvl="0"/>
             <a:r>
-              <a:rPr lang="en-US" smtClean="0"/>
+              <a:rPr lang="en-US"/>
               <a:t>Click to edit Master text styles</a:t>
             </a:r>
           </a:p>
@@ -6122,35 +6119,35 @@
           <a:p>
             <a:pPr lvl="0"/>
             <a:r>
-              <a:rPr lang="en-US" smtClean="0"/>
+              <a:rPr lang="en-US"/>
               <a:t>Click to edit Master text styles</a:t>
             </a:r>
           </a:p>
           <a:p>
             <a:pPr lvl="1"/>
             <a:r>
-              <a:rPr lang="en-US" smtClean="0"/>
+              <a:rPr lang="en-US"/>
               <a:t>Second level</a:t>
             </a:r>
           </a:p>
           <a:p>
             <a:pPr lvl="2"/>
             <a:r>
-              <a:rPr lang="en-US" smtClean="0"/>
+              <a:rPr lang="en-US"/>
               <a:t>Third level</a:t>
             </a:r>
           </a:p>
           <a:p>
             <a:pPr lvl="3"/>
             <a:r>
-              <a:rPr lang="en-US" smtClean="0"/>
+              <a:rPr lang="en-US"/>
               <a:t>Fourth level</a:t>
             </a:r>
           </a:p>
           <a:p>
             <a:pPr lvl="4"/>
             <a:r>
-              <a:rPr lang="en-US" smtClean="0"/>
+              <a:rPr lang="en-US"/>
               <a:t>Fifth level</a:t>
             </a:r>
             <a:endParaRPr lang="en-US" dirty="0"/>
@@ -6216,7 +6213,7 @@
           <a:p>
             <a:pPr lvl="0"/>
             <a:r>
-              <a:rPr lang="en-US" smtClean="0"/>
+              <a:rPr lang="en-US"/>
               <a:t>Click to edit Master text styles</a:t>
             </a:r>
           </a:p>
@@ -6244,35 +6241,35 @@
           <a:p>
             <a:pPr lvl="0"/>
             <a:r>
-              <a:rPr lang="en-US" smtClean="0"/>
+              <a:rPr lang="en-US"/>
               <a:t>Click to edit Master text styles</a:t>
             </a:r>
           </a:p>
           <a:p>
             <a:pPr lvl="1"/>
             <a:r>
-              <a:rPr lang="en-US" smtClean="0"/>
+              <a:rPr lang="en-US"/>
               <a:t>Second level</a:t>
             </a:r>
           </a:p>
           <a:p>
             <a:pPr lvl="2"/>
             <a:r>
-              <a:rPr lang="en-US" smtClean="0"/>
+              <a:rPr lang="en-US"/>
               <a:t>Third level</a:t>
             </a:r>
           </a:p>
           <a:p>
             <a:pPr lvl="3"/>
             <a:r>
-              <a:rPr lang="en-US" smtClean="0"/>
+              <a:rPr lang="en-US"/>
               <a:t>Fourth level</a:t>
             </a:r>
           </a:p>
           <a:p>
             <a:pPr lvl="4"/>
             <a:r>
-              <a:rPr lang="en-US" smtClean="0"/>
+              <a:rPr lang="en-US"/>
               <a:t>Fifth level</a:t>
             </a:r>
             <a:endParaRPr lang="en-US" dirty="0"/>
@@ -6296,7 +6293,7 @@
           <a:p>
             <a:fld id="{51673806-0BCD-1F42-BAA8-2011034B3C6A}" type="datetimeFigureOut">
               <a:rPr lang="en-US" smtClean="0"/>
-              <a:t>5/7/21</a:t>
+              <a:t>5/12/21</a:t>
             </a:fld>
             <a:endParaRPr lang="en-US"/>
           </a:p>
@@ -6529,7 +6526,7 @@
           <a:lstStyle/>
           <a:p>
             <a:r>
-              <a:rPr lang="en-US" smtClean="0"/>
+              <a:rPr lang="en-US"/>
               <a:t>Click to edit Master title style</a:t>
             </a:r>
             <a:endParaRPr lang="en-US" dirty="0"/>
@@ -6553,7 +6550,7 @@
           <a:p>
             <a:fld id="{51673806-0BCD-1F42-BAA8-2011034B3C6A}" type="datetimeFigureOut">
               <a:rPr lang="en-US" smtClean="0"/>
-              <a:t>5/7/21</a:t>
+              <a:t>5/12/21</a:t>
             </a:fld>
             <a:endParaRPr lang="en-US"/>
           </a:p>
@@ -6711,7 +6708,7 @@
           <a:p>
             <a:fld id="{51673806-0BCD-1F42-BAA8-2011034B3C6A}" type="datetimeFigureOut">
               <a:rPr lang="en-US" smtClean="0"/>
-              <a:t>5/7/21</a:t>
+              <a:t>5/12/21</a:t>
             </a:fld>
             <a:endParaRPr lang="en-US"/>
           </a:p>
@@ -6955,7 +6952,7 @@
           </a:lstStyle>
           <a:p>
             <a:r>
-              <a:rPr lang="en-US" smtClean="0"/>
+              <a:rPr lang="en-US"/>
               <a:t>Click to edit Master title style</a:t>
             </a:r>
             <a:endParaRPr lang="en-US" dirty="0"/>
@@ -6984,35 +6981,35 @@
           <a:p>
             <a:pPr lvl="0"/>
             <a:r>
-              <a:rPr lang="en-US" smtClean="0"/>
+              <a:rPr lang="en-US"/>
               <a:t>Click to edit Master text styles</a:t>
             </a:r>
           </a:p>
           <a:p>
             <a:pPr lvl="1"/>
             <a:r>
-              <a:rPr lang="en-US" smtClean="0"/>
+              <a:rPr lang="en-US"/>
               <a:t>Second level</a:t>
             </a:r>
           </a:p>
           <a:p>
             <a:pPr lvl="2"/>
             <a:r>
-              <a:rPr lang="en-US" smtClean="0"/>
+              <a:rPr lang="en-US"/>
               <a:t>Third level</a:t>
             </a:r>
           </a:p>
           <a:p>
             <a:pPr lvl="3"/>
             <a:r>
-              <a:rPr lang="en-US" smtClean="0"/>
+              <a:rPr lang="en-US"/>
               <a:t>Fourth level</a:t>
             </a:r>
           </a:p>
           <a:p>
             <a:pPr lvl="4"/>
             <a:r>
-              <a:rPr lang="en-US" smtClean="0"/>
+              <a:rPr lang="en-US"/>
               <a:t>Fifth level</a:t>
             </a:r>
             <a:endParaRPr lang="en-US" dirty="0"/>
@@ -7078,7 +7075,7 @@
           <a:p>
             <a:pPr lvl="0"/>
             <a:r>
-              <a:rPr lang="en-US" smtClean="0"/>
+              <a:rPr lang="en-US"/>
               <a:t>Click to edit Master text styles</a:t>
             </a:r>
           </a:p>
@@ -7101,7 +7098,7 @@
           <a:p>
             <a:fld id="{51673806-0BCD-1F42-BAA8-2011034B3C6A}" type="datetimeFigureOut">
               <a:rPr lang="en-US" smtClean="0"/>
-              <a:t>5/7/21</a:t>
+              <a:t>5/12/21</a:t>
             </a:fld>
             <a:endParaRPr lang="en-US"/>
           </a:p>
@@ -7345,7 +7342,7 @@
           </a:lstStyle>
           <a:p>
             <a:r>
-              <a:rPr lang="en-US" smtClean="0"/>
+              <a:rPr lang="en-US"/>
               <a:t>Click to edit Master title style</a:t>
             </a:r>
             <a:endParaRPr lang="en-US" dirty="0"/>
@@ -7421,7 +7418,7 @@
           </a:lstStyle>
           <a:p>
             <a:r>
-              <a:rPr lang="en-US" smtClean="0"/>
+              <a:rPr lang="en-US"/>
               <a:t>Drag picture to placeholder or click icon to add</a:t>
             </a:r>
             <a:endParaRPr lang="en-US" dirty="0"/>
@@ -7487,7 +7484,7 @@
           <a:p>
             <a:pPr lvl="0"/>
             <a:r>
-              <a:rPr lang="en-US" smtClean="0"/>
+              <a:rPr lang="en-US"/>
               <a:t>Click to edit Master text styles</a:t>
             </a:r>
           </a:p>
@@ -7510,7 +7507,7 @@
           <a:p>
             <a:fld id="{51673806-0BCD-1F42-BAA8-2011034B3C6A}" type="datetimeFigureOut">
               <a:rPr lang="en-US" smtClean="0"/>
-              <a:t>5/7/21</a:t>
+              <a:t>5/12/21</a:t>
             </a:fld>
             <a:endParaRPr lang="en-US"/>
           </a:p>
@@ -7532,7 +7529,7 @@
           <a:lstStyle/>
           <a:p>
             <a:r>
-              <a:rPr lang="en-US" smtClean="0"/>
+              <a:rPr lang="en-US"/>
               <a:t>
               </a:t>
             </a:r>
@@ -7650,10 +7647,9 @@
           <a:lstStyle/>
           <a:p>
             <a:r>
-              <a:rPr lang="en-US" dirty="0" smtClean="0"/>
+              <a:rPr lang="en-US" dirty="0"/>
               <a:t>Click to edit Master title style</a:t>
             </a:r>
-            <a:endParaRPr lang="en-US" dirty="0"/>
           </a:p>
         </p:txBody>
       </p:sp>
@@ -7684,38 +7680,37 @@
           <a:p>
             <a:pPr lvl="0"/>
             <a:r>
-              <a:rPr lang="en-US" dirty="0" smtClean="0"/>
+              <a:rPr lang="en-US" dirty="0"/>
               <a:t>Click to edit Master text styles</a:t>
             </a:r>
           </a:p>
           <a:p>
             <a:pPr lvl="1"/>
             <a:r>
-              <a:rPr lang="en-US" dirty="0" smtClean="0"/>
+              <a:rPr lang="en-US" dirty="0"/>
               <a:t>Second level</a:t>
             </a:r>
           </a:p>
           <a:p>
             <a:pPr lvl="2"/>
             <a:r>
-              <a:rPr lang="en-US" dirty="0" smtClean="0"/>
+              <a:rPr lang="en-US" dirty="0"/>
               <a:t>Third level</a:t>
             </a:r>
           </a:p>
           <a:p>
             <a:pPr lvl="3"/>
             <a:r>
-              <a:rPr lang="en-US" dirty="0" smtClean="0"/>
+              <a:rPr lang="en-US" dirty="0"/>
               <a:t>Fourth level</a:t>
             </a:r>
           </a:p>
           <a:p>
             <a:pPr lvl="4"/>
             <a:r>
-              <a:rPr lang="en-US" dirty="0" smtClean="0"/>
+              <a:rPr lang="en-US" dirty="0"/>
               <a:t>Fifth level</a:t>
             </a:r>
-            <a:endParaRPr lang="en-US" dirty="0"/>
           </a:p>
         </p:txBody>
       </p:sp>
@@ -7758,7 +7753,7 @@
             <a:fld id="{51673806-0BCD-1F42-BAA8-2011034B3C6A}" type="datetimeFigureOut">
               <a:rPr lang="en-US" smtClean="0"/>
               <a:pPr/>
-              <a:t>5/7/21</a:t>
+              <a:t>5/12/21</a:t>
             </a:fld>
             <a:endParaRPr lang="en-US" dirty="0"/>
           </a:p>
@@ -8197,10 +8192,9 @@
           <a:lstStyle/>
           <a:p>
             <a:r>
-              <a:rPr lang="en-US" dirty="0" smtClean="0"/>
+              <a:rPr lang="en-US" dirty="0"/>
               <a:t>File I/O</a:t>
             </a:r>
-            <a:endParaRPr lang="en-US" dirty="0"/>
           </a:p>
         </p:txBody>
       </p:sp>
@@ -8223,11 +8217,7 @@
           <a:p>
             <a:r>
               <a:rPr lang="en-US"/>
-              <a:t>SURP </a:t>
-            </a:r>
-            <a:r>
-              <a:rPr lang="en-US" smtClean="0"/>
-              <a:t>2021 </a:t>
+              <a:t>SURP 2021 </a:t>
             </a:r>
             <a:r>
               <a:rPr lang="en-US" dirty="0"/>
@@ -8243,13 +8233,8 @@
           <a:p>
             <a:r>
               <a:rPr lang="en-US" dirty="0"/>
-              <a:t>Slides by: James W. </a:t>
-            </a:r>
-            <a:r>
-              <a:rPr lang="en-US" dirty="0" smtClean="0"/>
-              <a:t>Johnson</a:t>
-            </a:r>
-            <a:endParaRPr lang="en-US" dirty="0"/>
+              <a:t>Slides by: James W. Johnson</a:t>
+            </a:r>
           </a:p>
         </p:txBody>
       </p:sp>
@@ -8299,10 +8284,9 @@
           <a:lstStyle/>
           <a:p>
             <a:r>
-              <a:rPr lang="en-US" dirty="0" smtClean="0"/>
+              <a:rPr lang="en-US" dirty="0"/>
               <a:t>Objectives </a:t>
             </a:r>
-            <a:endParaRPr lang="en-US" dirty="0"/>
           </a:p>
         </p:txBody>
       </p:sp>
@@ -8346,7 +8330,7 @@
               <a:defRPr/>
             </a:pPr>
             <a:r>
-              <a:rPr lang="en-US" dirty="0" smtClean="0"/>
+              <a:rPr lang="en-US" dirty="0"/>
               <a:t>An example of how to write to a text file with standard library </a:t>
             </a:r>
           </a:p>
@@ -8368,7 +8352,7 @@
               <a:tabLst/>
               <a:defRPr/>
             </a:pPr>
-            <a:endParaRPr lang="en-US" dirty="0" smtClean="0"/>
+            <a:endParaRPr lang="en-US" dirty="0"/>
           </a:p>
           <a:p>
             <a:pPr marL="0" marR="0" lvl="0" indent="0" defTabSz="914400" eaLnBrk="1" fontAlgn="auto" latinLnBrk="0" hangingPunct="1">
@@ -8409,7 +8393,7 @@
               <a:defRPr/>
             </a:pPr>
             <a:r>
-              <a:rPr lang="en-US" dirty="0" smtClean="0"/>
+              <a:rPr lang="en-US" dirty="0"/>
               <a:t>An example of reading that same text file with standard library </a:t>
             </a:r>
           </a:p>
@@ -8431,7 +8415,7 @@
               <a:tabLst/>
               <a:defRPr/>
             </a:pPr>
-            <a:endParaRPr lang="en-US" dirty="0" smtClean="0"/>
+            <a:endParaRPr lang="en-US" dirty="0"/>
           </a:p>
           <a:p>
             <a:pPr marL="0" marR="0" lvl="0" indent="0" defTabSz="914400" eaLnBrk="1" fontAlgn="auto" latinLnBrk="0" hangingPunct="1">
@@ -8472,18 +8456,17 @@
               <a:defRPr/>
             </a:pPr>
             <a:r>
-              <a:rPr lang="en-US" dirty="0" smtClean="0"/>
+              <a:rPr lang="en-US" dirty="0"/>
               <a:t>How </a:t>
             </a:r>
             <a:r>
-              <a:rPr lang="en-US" dirty="0" err="1" smtClean="0"/>
+              <a:rPr lang="en-US" dirty="0" err="1"/>
               <a:t>NumPy</a:t>
             </a:r>
             <a:r>
-              <a:rPr lang="en-US" dirty="0" smtClean="0"/>
+              <a:rPr lang="en-US" dirty="0"/>
               <a:t> simplifies things </a:t>
             </a:r>
-            <a:endParaRPr lang="en-US" dirty="0"/>
           </a:p>
         </p:txBody>
       </p:sp>
@@ -8533,10 +8516,9 @@
           <a:lstStyle/>
           <a:p>
             <a:r>
-              <a:rPr lang="en-US" dirty="0" smtClean="0"/>
+              <a:rPr lang="en-US" dirty="0"/>
               <a:t>An Example Output File </a:t>
             </a:r>
-            <a:endParaRPr lang="en-US" dirty="0"/>
           </a:p>
         </p:txBody>
       </p:sp>
@@ -8578,8 +8560,8 @@
               <a:defRPr/>
             </a:pPr>
             <a:r>
-              <a:rPr lang="en-US" dirty="0" smtClean="0"/>
-              <a:t>Write the integers 0 through 9 and their squares separated tabs, with each integer-square pair on separate lines </a:t>
+              <a:rPr lang="en-US" dirty="0"/>
+              <a:t>Write the integers 0 through 9 and their squares separated by tabs, with each integer-square pair on separate lines </a:t>
             </a:r>
           </a:p>
           <a:p>
@@ -8620,7 +8602,7 @@
               <a:tabLst/>
               <a:defRPr/>
             </a:pPr>
-            <a:endParaRPr lang="en-US" dirty="0" smtClean="0"/>
+            <a:endParaRPr lang="en-US" dirty="0"/>
           </a:p>
           <a:p>
             <a:pPr marL="0" marR="0" lvl="0" indent="0" defTabSz="914400" eaLnBrk="1" fontAlgn="auto" latinLnBrk="0" hangingPunct="1">
@@ -8660,7 +8642,7 @@
               <a:tabLst/>
               <a:defRPr/>
             </a:pPr>
-            <a:endParaRPr lang="en-US" dirty="0" smtClean="0"/>
+            <a:endParaRPr lang="en-US" dirty="0"/>
           </a:p>
           <a:p>
             <a:pPr marL="0" marR="0" lvl="0" indent="0" defTabSz="914400" eaLnBrk="1" fontAlgn="auto" latinLnBrk="0" hangingPunct="1">
@@ -8700,7 +8682,7 @@
               <a:tabLst/>
               <a:defRPr/>
             </a:pPr>
-            <a:endParaRPr lang="en-US" dirty="0" smtClean="0"/>
+            <a:endParaRPr lang="en-US" dirty="0"/>
           </a:p>
           <a:p>
             <a:pPr marL="0" marR="0" lvl="0" indent="0" defTabSz="914400" eaLnBrk="1" fontAlgn="auto" latinLnBrk="0" hangingPunct="1">
@@ -8720,7 +8702,7 @@
               <a:tabLst/>
               <a:defRPr/>
             </a:pPr>
-            <a:endParaRPr lang="en-US" dirty="0" smtClean="0"/>
+            <a:endParaRPr lang="en-US" dirty="0"/>
           </a:p>
           <a:p>
             <a:pPr marL="0" marR="0" lvl="0" indent="0" defTabSz="914400" eaLnBrk="1" fontAlgn="auto" latinLnBrk="0" hangingPunct="1">
@@ -8741,35 +8723,35 @@
               <a:defRPr/>
             </a:pPr>
             <a:r>
-              <a:rPr lang="en-US" dirty="0" smtClean="0"/>
+              <a:rPr lang="en-US" dirty="0"/>
               <a:t>Note: file I/O is typically done with a </a:t>
             </a:r>
             <a:r>
-              <a:rPr lang="en-US" i="1" dirty="0" smtClean="0"/>
+              <a:rPr lang="en-US" i="1" dirty="0"/>
               <a:t>with</a:t>
             </a:r>
             <a:r>
-              <a:rPr lang="en-US" dirty="0" smtClean="0"/>
+              <a:rPr lang="en-US" dirty="0"/>
               <a:t> statement </a:t>
             </a:r>
             <a:r>
-              <a:rPr lang="mr-IN" dirty="0" smtClean="0"/>
+              <a:rPr lang="mr-IN" dirty="0"/>
               <a:t>–</a:t>
             </a:r>
             <a:r>
-              <a:rPr lang="en-US" dirty="0" smtClean="0"/>
+              <a:rPr lang="en-US" dirty="0"/>
               <a:t> this is functionally the same as using  </a:t>
             </a:r>
             <a:r>
-              <a:rPr lang="en-US" i="1" dirty="0" smtClean="0"/>
+              <a:rPr lang="en-US" i="1" dirty="0"/>
               <a:t>f = open(“</a:t>
             </a:r>
             <a:r>
-              <a:rPr lang="en-US" i="1" dirty="0" err="1" smtClean="0"/>
+              <a:rPr lang="en-US" i="1" dirty="0" err="1"/>
               <a:t>example.txt</a:t>
             </a:r>
             <a:r>
-              <a:rPr lang="en-US" i="1" dirty="0" smtClean="0"/>
+              <a:rPr lang="en-US" i="1" dirty="0"/>
               <a:t>”, ‘w’) </a:t>
             </a:r>
             <a:endParaRPr lang="en-US" dirty="0"/>
@@ -8846,13 +8828,6 @@
   <p:clrMapOvr>
     <a:masterClrMapping/>
   </p:clrMapOvr>
-  <p:timing>
-    <p:tnLst>
-      <p:par>
-        <p:cTn id="1" dur="indefinite" restart="never" nodeType="tmRoot"/>
-      </p:par>
-    </p:tnLst>
-  </p:timing>
 </p:sld>
 </file>
 
@@ -8889,10 +8864,9 @@
           <a:lstStyle/>
           <a:p>
             <a:r>
-              <a:rPr lang="en-US" dirty="0" smtClean="0"/>
+              <a:rPr lang="en-US" dirty="0"/>
               <a:t>An Example Output File: A Better Code  </a:t>
             </a:r>
-            <a:endParaRPr lang="en-US" dirty="0"/>
           </a:p>
         </p:txBody>
       </p:sp>
@@ -8934,23 +8908,23 @@
               <a:defRPr/>
             </a:pPr>
             <a:r>
-              <a:rPr lang="en-US" dirty="0" smtClean="0"/>
+              <a:rPr lang="en-US" dirty="0"/>
               <a:t>Makes use of </a:t>
             </a:r>
             <a:r>
-              <a:rPr lang="en-US" i="1" dirty="0" smtClean="0"/>
+              <a:rPr lang="en-US" i="1" dirty="0"/>
               <a:t>string formatting</a:t>
             </a:r>
             <a:r>
-              <a:rPr lang="en-US" dirty="0" smtClean="0"/>
+              <a:rPr lang="en-US" dirty="0"/>
               <a:t>: </a:t>
             </a:r>
             <a:r>
-              <a:rPr lang="en-US" i="1" dirty="0" smtClean="0"/>
+              <a:rPr lang="en-US" i="1" dirty="0"/>
               <a:t>%d</a:t>
             </a:r>
             <a:r>
-              <a:rPr lang="en-US" dirty="0" smtClean="0"/>
+              <a:rPr lang="en-US" dirty="0"/>
               <a:t> allows integers to be substituted in their place </a:t>
             </a:r>
           </a:p>
@@ -8972,7 +8946,7 @@
               <a:tabLst/>
               <a:defRPr/>
             </a:pPr>
-            <a:endParaRPr lang="en-US" dirty="0" smtClean="0"/>
+            <a:endParaRPr lang="en-US" dirty="0"/>
           </a:p>
           <a:p>
             <a:pPr marL="0" marR="0" lvl="0" indent="0" defTabSz="914400" eaLnBrk="1" fontAlgn="auto" latinLnBrk="0" hangingPunct="1">
@@ -9012,7 +8986,7 @@
               <a:tabLst/>
               <a:defRPr/>
             </a:pPr>
-            <a:endParaRPr lang="en-US" dirty="0" smtClean="0"/>
+            <a:endParaRPr lang="en-US" dirty="0"/>
           </a:p>
           <a:p>
             <a:pPr marL="0" marR="0" lvl="0" indent="0" defTabSz="914400" eaLnBrk="1" fontAlgn="auto" latinLnBrk="0" hangingPunct="1">
@@ -9052,7 +9026,7 @@
               <a:tabLst/>
               <a:defRPr/>
             </a:pPr>
-            <a:endParaRPr lang="en-US" dirty="0" smtClean="0"/>
+            <a:endParaRPr lang="en-US" dirty="0"/>
           </a:p>
           <a:p>
             <a:pPr marL="0" marR="0" lvl="0" indent="0" defTabSz="914400" eaLnBrk="1" fontAlgn="auto" latinLnBrk="0" hangingPunct="1">
@@ -9092,7 +9066,7 @@
               <a:tabLst/>
               <a:defRPr/>
             </a:pPr>
-            <a:endParaRPr lang="en-US" dirty="0" smtClean="0"/>
+            <a:endParaRPr lang="en-US" dirty="0"/>
           </a:p>
           <a:p>
             <a:pPr marL="0" marR="0" lvl="0" indent="0" defTabSz="914400" eaLnBrk="1" fontAlgn="auto" latinLnBrk="0" hangingPunct="1">
@@ -9113,7 +9087,7 @@
               <a:defRPr/>
             </a:pPr>
             <a:r>
-              <a:rPr lang="en-US" dirty="0" smtClean="0"/>
+              <a:rPr lang="en-US" dirty="0"/>
               <a:t>There are many ways to format string in python: The %-style notation will look familiar if you have experience with C/C++ </a:t>
             </a:r>
           </a:p>
@@ -9131,16 +9105,10 @@
               <a:rPr lang="en-US" dirty="0">
                 <a:hlinkClick r:id="rId2"/>
               </a:rPr>
-              <a:t>https://</a:t>
-            </a:r>
-            <a:r>
-              <a:rPr lang="en-US" dirty="0" smtClean="0">
-                <a:hlinkClick r:id="rId2"/>
-              </a:rPr>
-              <a:t>docs.python.org/3.7/library/string.html</a:t>
-            </a:r>
-            <a:r>
-              <a:rPr lang="en-US" dirty="0" smtClean="0"/>
+              <a:t>https://docs.python.org/3.7/library/string.html</a:t>
+            </a:r>
+            <a:r>
+              <a:rPr lang="en-US" dirty="0"/>
               <a:t> </a:t>
             </a:r>
           </a:p>
@@ -9216,13 +9184,6 @@
   <p:clrMapOvr>
     <a:masterClrMapping/>
   </p:clrMapOvr>
-  <p:timing>
-    <p:tnLst>
-      <p:par>
-        <p:cTn id="1" dur="indefinite" restart="never" nodeType="tmRoot"/>
-      </p:par>
-    </p:tnLst>
-  </p:timing>
 </p:sld>
 </file>
 
@@ -9259,10 +9220,9 @@
           <a:lstStyle/>
           <a:p>
             <a:r>
-              <a:rPr lang="en-US" dirty="0" smtClean="0"/>
+              <a:rPr lang="en-US" dirty="0"/>
               <a:t>An Example Input File</a:t>
             </a:r>
-            <a:endParaRPr lang="en-US" dirty="0"/>
           </a:p>
         </p:txBody>
       </p:sp>
@@ -9306,7 +9266,7 @@
               <a:defRPr/>
             </a:pPr>
             <a:r>
-              <a:rPr lang="en-US" dirty="0" smtClean="0"/>
+              <a:rPr lang="en-US" dirty="0"/>
               <a:t>Read in the same file and store it in a 2D-list </a:t>
             </a:r>
           </a:p>
@@ -9348,7 +9308,7 @@
               <a:tabLst/>
               <a:defRPr/>
             </a:pPr>
-            <a:endParaRPr lang="en-US" dirty="0" smtClean="0"/>
+            <a:endParaRPr lang="en-US" dirty="0"/>
           </a:p>
           <a:p>
             <a:pPr marL="0" marR="0" lvl="0" indent="0" defTabSz="914400" eaLnBrk="1" fontAlgn="auto" latinLnBrk="0" hangingPunct="1">
@@ -9388,7 +9348,7 @@
               <a:tabLst/>
               <a:defRPr/>
             </a:pPr>
-            <a:endParaRPr lang="en-US" dirty="0" smtClean="0"/>
+            <a:endParaRPr lang="en-US" dirty="0"/>
           </a:p>
           <a:p>
             <a:pPr marL="0" marR="0" lvl="0" indent="0" defTabSz="914400" eaLnBrk="1" fontAlgn="auto" latinLnBrk="0" hangingPunct="1">
@@ -9428,7 +9388,7 @@
               <a:tabLst/>
               <a:defRPr/>
             </a:pPr>
-            <a:endParaRPr lang="en-US" dirty="0" smtClean="0"/>
+            <a:endParaRPr lang="en-US" dirty="0"/>
           </a:p>
           <a:p>
             <a:pPr marL="0" marR="0" lvl="0" indent="0" defTabSz="914400" eaLnBrk="1" fontAlgn="auto" latinLnBrk="0" hangingPunct="1">
@@ -9468,7 +9428,7 @@
               <a:tabLst/>
               <a:defRPr/>
             </a:pPr>
-            <a:endParaRPr lang="en-US" dirty="0" smtClean="0"/>
+            <a:endParaRPr lang="en-US" dirty="0"/>
           </a:p>
           <a:p>
             <a:pPr marL="0" marR="0" lvl="0" indent="0" defTabSz="914400" eaLnBrk="1" fontAlgn="auto" latinLnBrk="0" hangingPunct="1">
@@ -9509,18 +9469,17 @@
               <a:defRPr/>
             </a:pPr>
             <a:r>
-              <a:rPr lang="en-US" dirty="0" smtClean="0"/>
+              <a:rPr lang="en-US" dirty="0"/>
               <a:t>Note: </a:t>
             </a:r>
             <a:r>
-              <a:rPr lang="en-US" i="1" dirty="0" smtClean="0"/>
+              <a:rPr lang="en-US" i="1" dirty="0"/>
               <a:t>append</a:t>
             </a:r>
             <a:r>
-              <a:rPr lang="en-US" dirty="0" smtClean="0"/>
+              <a:rPr lang="en-US" dirty="0"/>
               <a:t> is a bad idea when lists are large, though people argue about this</a:t>
             </a:r>
-            <a:endParaRPr lang="en-US" dirty="0"/>
           </a:p>
         </p:txBody>
       </p:sp>
@@ -9594,13 +9553,6 @@
   <p:clrMapOvr>
     <a:masterClrMapping/>
   </p:clrMapOvr>
-  <p:timing>
-    <p:tnLst>
-      <p:par>
-        <p:cTn id="1" dur="indefinite" restart="never" nodeType="tmRoot"/>
-      </p:par>
-    </p:tnLst>
-  </p:timing>
 </p:sld>
 </file>
 
@@ -9637,10 +9589,9 @@
           <a:lstStyle/>
           <a:p>
             <a:r>
-              <a:rPr lang="en-US" dirty="0" smtClean="0"/>
+              <a:rPr lang="en-US" dirty="0"/>
               <a:t>A Much Simpler Approach</a:t>
             </a:r>
-            <a:endParaRPr lang="en-US" dirty="0"/>
           </a:p>
         </p:txBody>
       </p:sp>
@@ -9682,31 +9633,31 @@
               <a:defRPr/>
             </a:pPr>
             <a:r>
-              <a:rPr lang="en-US" dirty="0" smtClean="0"/>
+              <a:rPr lang="en-US" dirty="0"/>
               <a:t>File I/O is made easy with </a:t>
             </a:r>
             <a:r>
-              <a:rPr lang="en-US" dirty="0" err="1" smtClean="0"/>
+              <a:rPr lang="en-US" dirty="0" err="1"/>
               <a:t>NumPy’s</a:t>
             </a:r>
             <a:r>
-              <a:rPr lang="en-US" dirty="0" smtClean="0"/>
+              <a:rPr lang="en-US" dirty="0"/>
               <a:t> </a:t>
             </a:r>
             <a:r>
-              <a:rPr lang="en-US" i="1" dirty="0" err="1" smtClean="0"/>
+              <a:rPr lang="en-US" i="1" dirty="0" err="1"/>
               <a:t>genfromtxt</a:t>
             </a:r>
             <a:r>
-              <a:rPr lang="en-US" dirty="0" smtClean="0"/>
+              <a:rPr lang="en-US" dirty="0"/>
               <a:t>, </a:t>
             </a:r>
             <a:r>
-              <a:rPr lang="en-US" i="1" dirty="0" err="1" smtClean="0"/>
+              <a:rPr lang="en-US" i="1" dirty="0" err="1"/>
               <a:t>savetxt</a:t>
             </a:r>
             <a:r>
-              <a:rPr lang="en-US" dirty="0" smtClean="0"/>
+              <a:rPr lang="en-US" dirty="0"/>
               <a:t>, etc. functions </a:t>
             </a:r>
           </a:p>
@@ -9749,7 +9700,7 @@
               <a:defRPr/>
             </a:pPr>
             <a:r>
-              <a:rPr lang="en-US" dirty="0" smtClean="0"/>
+              <a:rPr lang="en-US" dirty="0"/>
               <a:t>These functions read and write 1-D and 2-D data to files. </a:t>
             </a:r>
           </a:p>
@@ -9763,14 +9714,14 @@
               </a:spcBef>
             </a:pPr>
             <a:r>
-              <a:rPr lang="en-US" dirty="0" smtClean="0"/>
+              <a:rPr lang="en-US" dirty="0"/>
               <a:t>Caveat: The data must be square. Chances are you’ll </a:t>
             </a:r>
             <a:r>
-              <a:rPr lang="en-US" smtClean="0"/>
+              <a:rPr lang="en-US"/>
               <a:t>get non-square data at some point </a:t>
             </a:r>
-            <a:endParaRPr lang="en-US" dirty="0" smtClean="0"/>
+            <a:endParaRPr lang="en-US" dirty="0"/>
           </a:p>
           <a:p>
             <a:pPr marL="0" indent="0">
@@ -9794,7 +9745,7 @@
               </a:spcBef>
               <a:buNone/>
             </a:pPr>
-            <a:endParaRPr lang="en-US" dirty="0" smtClean="0"/>
+            <a:endParaRPr lang="en-US" dirty="0"/>
           </a:p>
           <a:p>
             <a:pPr marL="0" indent="0">
@@ -9807,15 +9758,15 @@
               <a:buNone/>
             </a:pPr>
             <a:r>
-              <a:rPr lang="en-US" dirty="0" smtClean="0"/>
+              <a:rPr lang="en-US" dirty="0"/>
               <a:t>In the previous example, the entire </a:t>
             </a:r>
             <a:r>
-              <a:rPr lang="en-US" i="1" dirty="0" smtClean="0"/>
+              <a:rPr lang="en-US" i="1" dirty="0"/>
               <a:t>with</a:t>
             </a:r>
             <a:r>
-              <a:rPr lang="en-US" dirty="0" smtClean="0"/>
+              <a:rPr lang="en-US" dirty="0"/>
               <a:t> block can be replaced by: </a:t>
             </a:r>
           </a:p>
@@ -9834,15 +9785,15 @@
               <a:t>	</a:t>
             </a:r>
             <a:r>
-              <a:rPr lang="en-US" i="1" dirty="0" smtClean="0"/>
+              <a:rPr lang="en-US" i="1" dirty="0"/>
               <a:t>import </a:t>
             </a:r>
             <a:r>
-              <a:rPr lang="en-US" i="1" dirty="0" err="1" smtClean="0"/>
+              <a:rPr lang="en-US" i="1" dirty="0" err="1"/>
               <a:t>numpy</a:t>
             </a:r>
             <a:r>
-              <a:rPr lang="en-US" i="1" dirty="0" smtClean="0"/>
+              <a:rPr lang="en-US" i="1" dirty="0"/>
               <a:t> as np </a:t>
             </a:r>
           </a:p>
@@ -9858,26 +9809,22 @@
             </a:pPr>
             <a:r>
               <a:rPr lang="en-US" i="1" dirty="0"/>
-              <a:t>	</a:t>
-            </a:r>
-            <a:r>
-              <a:rPr lang="en-US" i="1" dirty="0" smtClean="0"/>
-              <a:t>x = </a:t>
-            </a:r>
-            <a:r>
-              <a:rPr lang="en-US" i="1" dirty="0" err="1" smtClean="0"/>
+              <a:t>	x = </a:t>
+            </a:r>
+            <a:r>
+              <a:rPr lang="en-US" i="1" dirty="0" err="1"/>
               <a:t>np.genfromtxt</a:t>
             </a:r>
             <a:r>
-              <a:rPr lang="en-US" i="1" dirty="0" smtClean="0"/>
+              <a:rPr lang="en-US" i="1" dirty="0"/>
               <a:t>(“</a:t>
             </a:r>
             <a:r>
-              <a:rPr lang="en-US" i="1" dirty="0" err="1" smtClean="0"/>
+              <a:rPr lang="en-US" i="1" dirty="0" err="1"/>
               <a:t>example.txt</a:t>
             </a:r>
             <a:r>
-              <a:rPr lang="en-US" i="1" dirty="0" smtClean="0"/>
+              <a:rPr lang="en-US" i="1" dirty="0"/>
               <a:t>”) </a:t>
             </a:r>
           </a:p>
@@ -9896,15 +9843,15 @@
               <a:t>	</a:t>
             </a:r>
             <a:r>
-              <a:rPr lang="en-US" dirty="0" smtClean="0"/>
+              <a:rPr lang="en-US" dirty="0"/>
               <a:t>(Note however this returns a </a:t>
             </a:r>
             <a:r>
-              <a:rPr lang="en-US" dirty="0" err="1" smtClean="0"/>
+              <a:rPr lang="en-US" dirty="0" err="1"/>
               <a:t>NumPy</a:t>
             </a:r>
             <a:r>
-              <a:rPr lang="en-US" dirty="0" smtClean="0"/>
+              <a:rPr lang="en-US" dirty="0"/>
               <a:t> array, not a list) </a:t>
             </a:r>
           </a:p>

</xml_diff>

<commit_message>
slides: minor updates to session 2
</commit_message>
<xml_diff>
--- a/slides/fileIO.pptx
+++ b/slides/fileIO.pptx
@@ -202,7 +202,7 @@
           <a:p>
             <a:fld id="{1F23A399-7F87-6D46-845D-8770B3B26D43}" type="datetimeFigureOut">
               <a:rPr lang="en-US" smtClean="0"/>
-              <a:t>5/8/22</a:t>
+              <a:t>5/10/22</a:t>
             </a:fld>
             <a:endParaRPr lang="en-US"/>
           </a:p>
@@ -845,7 +845,7 @@
           <a:p>
             <a:fld id="{51673806-0BCD-1F42-BAA8-2011034B3C6A}" type="datetimeFigureOut">
               <a:rPr lang="en-US" smtClean="0"/>
-              <a:t>5/8/22</a:t>
+              <a:t>5/10/22</a:t>
             </a:fld>
             <a:endParaRPr lang="en-US"/>
           </a:p>
@@ -1259,7 +1259,7 @@
           <a:p>
             <a:fld id="{51673806-0BCD-1F42-BAA8-2011034B3C6A}" type="datetimeFigureOut">
               <a:rPr lang="en-US" smtClean="0"/>
-              <a:t>5/8/22</a:t>
+              <a:t>5/10/22</a:t>
             </a:fld>
             <a:endParaRPr lang="en-US"/>
           </a:p>
@@ -1590,7 +1590,7 @@
           <a:p>
             <a:fld id="{51673806-0BCD-1F42-BAA8-2011034B3C6A}" type="datetimeFigureOut">
               <a:rPr lang="en-US" smtClean="0"/>
-              <a:t>5/8/22</a:t>
+              <a:t>5/10/22</a:t>
             </a:fld>
             <a:endParaRPr lang="en-US"/>
           </a:p>
@@ -1990,7 +1990,7 @@
           <a:p>
             <a:fld id="{51673806-0BCD-1F42-BAA8-2011034B3C6A}" type="datetimeFigureOut">
               <a:rPr lang="en-US" smtClean="0"/>
-              <a:t>5/8/22</a:t>
+              <a:t>5/10/22</a:t>
             </a:fld>
             <a:endParaRPr lang="en-US"/>
           </a:p>
@@ -2553,7 +2553,7 @@
           <a:p>
             <a:fld id="{51673806-0BCD-1F42-BAA8-2011034B3C6A}" type="datetimeFigureOut">
               <a:rPr lang="en-US" smtClean="0"/>
-              <a:t>5/8/22</a:t>
+              <a:t>5/10/22</a:t>
             </a:fld>
             <a:endParaRPr lang="en-US"/>
           </a:p>
@@ -3229,7 +3229,7 @@
           <a:p>
             <a:fld id="{51673806-0BCD-1F42-BAA8-2011034B3C6A}" type="datetimeFigureOut">
               <a:rPr lang="en-US" smtClean="0"/>
-              <a:t>5/8/22</a:t>
+              <a:t>5/10/22</a:t>
             </a:fld>
             <a:endParaRPr lang="en-US"/>
           </a:p>
@@ -4137,7 +4137,7 @@
           <a:p>
             <a:fld id="{51673806-0BCD-1F42-BAA8-2011034B3C6A}" type="datetimeFigureOut">
               <a:rPr lang="en-US" smtClean="0"/>
-              <a:t>5/8/22</a:t>
+              <a:t>5/10/22</a:t>
             </a:fld>
             <a:endParaRPr lang="en-US"/>
           </a:p>
@@ -4445,7 +4445,7 @@
           <a:p>
             <a:fld id="{51673806-0BCD-1F42-BAA8-2011034B3C6A}" type="datetimeFigureOut">
               <a:rPr lang="en-US" smtClean="0"/>
-              <a:t>5/8/22</a:t>
+              <a:t>5/10/22</a:t>
             </a:fld>
             <a:endParaRPr lang="en-US"/>
           </a:p>
@@ -4704,7 +4704,7 @@
           <a:p>
             <a:fld id="{51673806-0BCD-1F42-BAA8-2011034B3C6A}" type="datetimeFigureOut">
               <a:rPr lang="en-US" smtClean="0"/>
-              <a:t>5/8/22</a:t>
+              <a:t>5/10/22</a:t>
             </a:fld>
             <a:endParaRPr lang="en-US"/>
           </a:p>
@@ -5027,7 +5027,7 @@
           <a:p>
             <a:fld id="{51673806-0BCD-1F42-BAA8-2011034B3C6A}" type="datetimeFigureOut">
               <a:rPr lang="en-US" smtClean="0"/>
-              <a:t>5/8/22</a:t>
+              <a:t>5/10/22</a:t>
             </a:fld>
             <a:endParaRPr lang="en-US"/>
           </a:p>
@@ -5411,7 +5411,7 @@
           <a:p>
             <a:fld id="{51673806-0BCD-1F42-BAA8-2011034B3C6A}" type="datetimeFigureOut">
               <a:rPr lang="en-US" smtClean="0"/>
-              <a:t>5/8/22</a:t>
+              <a:t>5/10/22</a:t>
             </a:fld>
             <a:endParaRPr lang="en-US"/>
           </a:p>
@@ -5787,7 +5787,7 @@
           <a:p>
             <a:fld id="{51673806-0BCD-1F42-BAA8-2011034B3C6A}" type="datetimeFigureOut">
               <a:rPr lang="en-US" smtClean="0"/>
-              <a:t>5/8/22</a:t>
+              <a:t>5/10/22</a:t>
             </a:fld>
             <a:endParaRPr lang="en-US"/>
           </a:p>
@@ -6293,7 +6293,7 @@
           <a:p>
             <a:fld id="{51673806-0BCD-1F42-BAA8-2011034B3C6A}" type="datetimeFigureOut">
               <a:rPr lang="en-US" smtClean="0"/>
-              <a:t>5/8/22</a:t>
+              <a:t>5/10/22</a:t>
             </a:fld>
             <a:endParaRPr lang="en-US"/>
           </a:p>
@@ -6550,7 +6550,7 @@
           <a:p>
             <a:fld id="{51673806-0BCD-1F42-BAA8-2011034B3C6A}" type="datetimeFigureOut">
               <a:rPr lang="en-US" smtClean="0"/>
-              <a:t>5/8/22</a:t>
+              <a:t>5/10/22</a:t>
             </a:fld>
             <a:endParaRPr lang="en-US"/>
           </a:p>
@@ -6708,7 +6708,7 @@
           <a:p>
             <a:fld id="{51673806-0BCD-1F42-BAA8-2011034B3C6A}" type="datetimeFigureOut">
               <a:rPr lang="en-US" smtClean="0"/>
-              <a:t>5/8/22</a:t>
+              <a:t>5/10/22</a:t>
             </a:fld>
             <a:endParaRPr lang="en-US"/>
           </a:p>
@@ -7098,7 +7098,7 @@
           <a:p>
             <a:fld id="{51673806-0BCD-1F42-BAA8-2011034B3C6A}" type="datetimeFigureOut">
               <a:rPr lang="en-US" smtClean="0"/>
-              <a:t>5/8/22</a:t>
+              <a:t>5/10/22</a:t>
             </a:fld>
             <a:endParaRPr lang="en-US"/>
           </a:p>
@@ -7507,7 +7507,7 @@
           <a:p>
             <a:fld id="{51673806-0BCD-1F42-BAA8-2011034B3C6A}" type="datetimeFigureOut">
               <a:rPr lang="en-US" smtClean="0"/>
-              <a:t>5/8/22</a:t>
+              <a:t>5/10/22</a:t>
             </a:fld>
             <a:endParaRPr lang="en-US"/>
           </a:p>
@@ -7753,7 +7753,7 @@
             <a:fld id="{51673806-0BCD-1F42-BAA8-2011034B3C6A}" type="datetimeFigureOut">
               <a:rPr lang="en-US" smtClean="0"/>
               <a:pPr/>
-              <a:t>5/8/22</a:t>
+              <a:t>5/10/22</a:t>
             </a:fld>
             <a:endParaRPr lang="en-US" dirty="0"/>
           </a:p>
@@ -8740,7 +8740,7 @@
             </a:r>
             <a:r>
               <a:rPr lang="en-US" dirty="0"/>
-              <a:t> this is functionally the same as using  </a:t>
+              <a:t> this functionally is the same as using  </a:t>
             </a:r>
             <a:r>
               <a:rPr lang="en-US" i="1" dirty="0"/>
@@ -9088,7 +9088,7 @@
             </a:pPr>
             <a:r>
               <a:rPr lang="en-US" dirty="0"/>
-              <a:t>There are many ways to format string in python: The %-style notation will look familiar if you have experience with C/C++ </a:t>
+              <a:t>There are many ways to format string in python: The %-style notation will look familiar if you have experience with C/C++</a:t>
             </a:r>
           </a:p>
           <a:p>
@@ -9105,7 +9105,7 @@
               <a:rPr lang="en-US" dirty="0">
                 <a:hlinkClick r:id="rId2"/>
               </a:rPr>
-              <a:t>https://docs.python.org/3.7/library/string.html</a:t>
+              <a:t>https://docs.python.org/3.10/library/string.html</a:t>
             </a:r>
             <a:r>
               <a:rPr lang="en-US" dirty="0"/>
@@ -9238,8 +9238,8 @@
         </p:nvSpPr>
         <p:spPr>
           <a:xfrm>
-            <a:off x="680321" y="2336872"/>
-            <a:ext cx="10684526" cy="4377827"/>
+            <a:off x="501041" y="2135288"/>
+            <a:ext cx="10863806" cy="4579411"/>
           </a:xfrm>
         </p:spPr>
         <p:txBody>
@@ -9470,7 +9470,7 @@
             </a:pPr>
             <a:r>
               <a:rPr lang="en-US" dirty="0"/>
-              <a:t>Note: </a:t>
+              <a:t>Note: Some argue that </a:t>
             </a:r>
             <a:r>
               <a:rPr lang="en-US" i="1" dirty="0"/>
@@ -9478,7 +9478,7 @@
             </a:r>
             <a:r>
               <a:rPr lang="en-US" dirty="0"/>
-              <a:t> is a bad idea when lists are large, though people argue about this</a:t>
+              <a:t> is a bad idea when lists are large, but others argue that the performance issues that arose are largely resolved</a:t>
             </a:r>
           </a:p>
         </p:txBody>
@@ -9535,7 +9535,7 @@
         </p:blipFill>
         <p:spPr>
           <a:xfrm>
-            <a:off x="7367517" y="2135288"/>
+            <a:off x="7206418" y="2022056"/>
             <a:ext cx="3997330" cy="3800901"/>
           </a:xfrm>
           <a:prstGeom prst="rect">

</xml_diff>